<commit_message>
update figures in latex
</commit_message>
<xml_diff>
--- a/figures/source-code-plot/timeseries-frame.pptx
+++ b/figures/source-code-plot/timeseries-frame.pptx
@@ -382,11 +382,11 @@
           <c:showBubbleSize val="0"/>
         </c:dLbls>
         <c:smooth val="0"/>
-        <c:axId val="60135808"/>
-        <c:axId val="60136368"/>
+        <c:axId val="117722032"/>
+        <c:axId val="117722592"/>
       </c:lineChart>
       <c:catAx>
-        <c:axId val="60135808"/>
+        <c:axId val="117722032"/>
         <c:scaling>
           <c:orientation val="minMax"/>
         </c:scaling>
@@ -426,7 +426,7 @@
             <a:endParaRPr lang="en-US"/>
           </a:p>
         </c:txPr>
-        <c:crossAx val="60136368"/>
+        <c:crossAx val="117722592"/>
         <c:crosses val="autoZero"/>
         <c:auto val="1"/>
         <c:lblAlgn val="ctr"/>
@@ -434,7 +434,7 @@
         <c:noMultiLvlLbl val="0"/>
       </c:catAx>
       <c:valAx>
-        <c:axId val="60136368"/>
+        <c:axId val="117722592"/>
         <c:scaling>
           <c:orientation val="minMax"/>
         </c:scaling>
@@ -482,7 +482,7 @@
             <a:endParaRPr lang="en-US"/>
           </a:p>
         </c:txPr>
-        <c:crossAx val="60135808"/>
+        <c:crossAx val="117722032"/>
         <c:crosses val="autoZero"/>
         <c:crossBetween val="between"/>
       </c:valAx>
@@ -794,11 +794,11 @@
         </c:dLbls>
         <c:marker val="1"/>
         <c:smooth val="0"/>
-        <c:axId val="60138608"/>
-        <c:axId val="120930064"/>
+        <c:axId val="117724832"/>
+        <c:axId val="117725392"/>
       </c:lineChart>
       <c:catAx>
-        <c:axId val="60138608"/>
+        <c:axId val="117724832"/>
         <c:scaling>
           <c:orientation val="minMax"/>
         </c:scaling>
@@ -838,7 +838,7 @@
             <a:endParaRPr lang="en-US"/>
           </a:p>
         </c:txPr>
-        <c:crossAx val="120930064"/>
+        <c:crossAx val="117725392"/>
         <c:crosses val="autoZero"/>
         <c:auto val="1"/>
         <c:lblAlgn val="ctr"/>
@@ -848,7 +848,7 @@
         <c:noMultiLvlLbl val="0"/>
       </c:catAx>
       <c:valAx>
-        <c:axId val="120930064"/>
+        <c:axId val="117725392"/>
         <c:scaling>
           <c:orientation val="minMax"/>
         </c:scaling>
@@ -902,7 +902,7 @@
             <a:endParaRPr lang="en-US"/>
           </a:p>
         </c:txPr>
-        <c:crossAx val="60138608"/>
+        <c:crossAx val="117724832"/>
         <c:crossesAt val="1"/>
         <c:crossBetween val="between"/>
       </c:valAx>
@@ -1211,11 +1211,11 @@
         </c:dLbls>
         <c:marker val="1"/>
         <c:smooth val="0"/>
-        <c:axId val="120932304"/>
-        <c:axId val="120932864"/>
+        <c:axId val="173557920"/>
+        <c:axId val="173558480"/>
       </c:lineChart>
       <c:catAx>
-        <c:axId val="120932304"/>
+        <c:axId val="173557920"/>
         <c:scaling>
           <c:orientation val="minMax"/>
         </c:scaling>
@@ -1255,7 +1255,7 @@
             <a:endParaRPr lang="en-US"/>
           </a:p>
         </c:txPr>
-        <c:crossAx val="120932864"/>
+        <c:crossAx val="173558480"/>
         <c:crosses val="autoZero"/>
         <c:auto val="1"/>
         <c:lblAlgn val="ctr"/>
@@ -1264,7 +1264,7 @@
         <c:noMultiLvlLbl val="0"/>
       </c:catAx>
       <c:valAx>
-        <c:axId val="120932864"/>
+        <c:axId val="173558480"/>
         <c:scaling>
           <c:orientation val="minMax"/>
         </c:scaling>
@@ -1312,7 +1312,7 @@
             <a:endParaRPr lang="en-US"/>
           </a:p>
         </c:txPr>
-        <c:crossAx val="120932304"/>
+        <c:crossAx val="173557920"/>
         <c:crosses val="autoZero"/>
         <c:crossBetween val="between"/>
       </c:valAx>
@@ -3106,7 +3106,7 @@
           <a:p>
             <a:fld id="{BD95DEEB-EB1A-4DBE-9A02-CCA516C4307E}" type="datetimeFigureOut">
               <a:rPr lang="en-US" smtClean="0"/>
-              <a:t>4/28/2016</a:t>
+              <a:t>4/30/2016</a:t>
             </a:fld>
             <a:endParaRPr lang="en-US"/>
           </a:p>
@@ -3673,7 +3673,7 @@
           <a:p>
             <a:fld id="{2DD4BC02-C082-4D59-A56C-B836D2E803E4}" type="datetimeFigureOut">
               <a:rPr lang="en-US" smtClean="0"/>
-              <a:t>4/28/2016</a:t>
+              <a:t>4/30/2016</a:t>
             </a:fld>
             <a:endParaRPr lang="en-US"/>
           </a:p>
@@ -3843,7 +3843,7 @@
           <a:p>
             <a:fld id="{2DD4BC02-C082-4D59-A56C-B836D2E803E4}" type="datetimeFigureOut">
               <a:rPr lang="en-US" smtClean="0"/>
-              <a:t>4/28/2016</a:t>
+              <a:t>4/30/2016</a:t>
             </a:fld>
             <a:endParaRPr lang="en-US"/>
           </a:p>
@@ -4023,7 +4023,7 @@
           <a:p>
             <a:fld id="{2DD4BC02-C082-4D59-A56C-B836D2E803E4}" type="datetimeFigureOut">
               <a:rPr lang="en-US" smtClean="0"/>
-              <a:t>4/28/2016</a:t>
+              <a:t>4/30/2016</a:t>
             </a:fld>
             <a:endParaRPr lang="en-US"/>
           </a:p>
@@ -4193,7 +4193,7 @@
           <a:p>
             <a:fld id="{2DD4BC02-C082-4D59-A56C-B836D2E803E4}" type="datetimeFigureOut">
               <a:rPr lang="en-US" smtClean="0"/>
-              <a:t>4/28/2016</a:t>
+              <a:t>4/30/2016</a:t>
             </a:fld>
             <a:endParaRPr lang="en-US"/>
           </a:p>
@@ -4439,7 +4439,7 @@
           <a:p>
             <a:fld id="{2DD4BC02-C082-4D59-A56C-B836D2E803E4}" type="datetimeFigureOut">
               <a:rPr lang="en-US" smtClean="0"/>
-              <a:t>4/28/2016</a:t>
+              <a:t>4/30/2016</a:t>
             </a:fld>
             <a:endParaRPr lang="en-US"/>
           </a:p>
@@ -4671,7 +4671,7 @@
           <a:p>
             <a:fld id="{2DD4BC02-C082-4D59-A56C-B836D2E803E4}" type="datetimeFigureOut">
               <a:rPr lang="en-US" smtClean="0"/>
-              <a:t>4/28/2016</a:t>
+              <a:t>4/30/2016</a:t>
             </a:fld>
             <a:endParaRPr lang="en-US"/>
           </a:p>
@@ -5038,7 +5038,7 @@
           <a:p>
             <a:fld id="{2DD4BC02-C082-4D59-A56C-B836D2E803E4}" type="datetimeFigureOut">
               <a:rPr lang="en-US" smtClean="0"/>
-              <a:t>4/28/2016</a:t>
+              <a:t>4/30/2016</a:t>
             </a:fld>
             <a:endParaRPr lang="en-US"/>
           </a:p>
@@ -5156,7 +5156,7 @@
           <a:p>
             <a:fld id="{2DD4BC02-C082-4D59-A56C-B836D2E803E4}" type="datetimeFigureOut">
               <a:rPr lang="en-US" smtClean="0"/>
-              <a:t>4/28/2016</a:t>
+              <a:t>4/30/2016</a:t>
             </a:fld>
             <a:endParaRPr lang="en-US"/>
           </a:p>
@@ -5251,7 +5251,7 @@
           <a:p>
             <a:fld id="{2DD4BC02-C082-4D59-A56C-B836D2E803E4}" type="datetimeFigureOut">
               <a:rPr lang="en-US" smtClean="0"/>
-              <a:t>4/28/2016</a:t>
+              <a:t>4/30/2016</a:t>
             </a:fld>
             <a:endParaRPr lang="en-US"/>
           </a:p>
@@ -5528,7 +5528,7 @@
           <a:p>
             <a:fld id="{2DD4BC02-C082-4D59-A56C-B836D2E803E4}" type="datetimeFigureOut">
               <a:rPr lang="en-US" smtClean="0"/>
-              <a:t>4/28/2016</a:t>
+              <a:t>4/30/2016</a:t>
             </a:fld>
             <a:endParaRPr lang="en-US"/>
           </a:p>
@@ -5781,7 +5781,7 @@
           <a:p>
             <a:fld id="{2DD4BC02-C082-4D59-A56C-B836D2E803E4}" type="datetimeFigureOut">
               <a:rPr lang="en-US" smtClean="0"/>
-              <a:t>4/28/2016</a:t>
+              <a:t>4/30/2016</a:t>
             </a:fld>
             <a:endParaRPr lang="en-US"/>
           </a:p>
@@ -5994,7 +5994,7 @@
           <a:p>
             <a:fld id="{2DD4BC02-C082-4D59-A56C-B836D2E803E4}" type="datetimeFigureOut">
               <a:rPr lang="en-US" smtClean="0"/>
-              <a:t>4/28/2016</a:t>
+              <a:t>4/30/2016</a:t>
             </a:fld>
             <a:endParaRPr lang="en-US"/>
           </a:p>
@@ -12860,19 +12860,12 @@
             </a:pPr>
             <a:r>
               <a:rPr lang="en-US" sz="2400" dirty="0" smtClean="0">
-                <a:solidFill>
-                  <a:schemeClr val="bg1"/>
-                </a:solidFill>
                 <a:latin typeface="Times New Roman" panose="02020603050405020304" pitchFamily="18" charset="0"/>
                 <a:cs typeface="Times New Roman" panose="02020603050405020304" pitchFamily="18" charset="0"/>
               </a:rPr>
               <a:t>Lack of water</a:t>
             </a:r>
-            <a:endParaRPr lang="en-US" sz="2400" dirty="0">
-              <a:solidFill>
-                <a:schemeClr val="bg1"/>
-              </a:solidFill>
-            </a:endParaRPr>
+            <a:endParaRPr lang="en-US" sz="2400" dirty="0"/>
           </a:p>
         </p:txBody>
       </p:sp>
@@ -13117,19 +13110,12 @@
             </a:pPr>
             <a:r>
               <a:rPr lang="en-US" sz="2400" dirty="0" smtClean="0">
-                <a:solidFill>
-                  <a:schemeClr val="bg1"/>
-                </a:solidFill>
                 <a:latin typeface="Times New Roman" panose="02020603050405020304" pitchFamily="18" charset="0"/>
                 <a:cs typeface="Times New Roman" panose="02020603050405020304" pitchFamily="18" charset="0"/>
               </a:rPr>
               <a:t>Gas shortage</a:t>
             </a:r>
-            <a:endParaRPr lang="en-US" sz="2400" dirty="0">
-              <a:solidFill>
-                <a:schemeClr val="bg1"/>
-              </a:solidFill>
-            </a:endParaRPr>
+            <a:endParaRPr lang="en-US" sz="2400" dirty="0"/>
           </a:p>
         </p:txBody>
       </p:sp>
@@ -13371,19 +13357,12 @@
             </a:pPr>
             <a:r>
               <a:rPr lang="en-US" sz="2400" dirty="0" smtClean="0">
-                <a:solidFill>
-                  <a:schemeClr val="bg1"/>
-                </a:solidFill>
                 <a:latin typeface="Times New Roman" panose="02020603050405020304" pitchFamily="18" charset="0"/>
                 <a:cs typeface="Times New Roman" panose="02020603050405020304" pitchFamily="18" charset="0"/>
               </a:rPr>
               <a:t>Other supply</a:t>
             </a:r>
-            <a:endParaRPr lang="en-US" sz="2400" dirty="0">
-              <a:solidFill>
-                <a:schemeClr val="bg1"/>
-              </a:solidFill>
-            </a:endParaRPr>
+            <a:endParaRPr lang="en-US" sz="2400" dirty="0"/>
           </a:p>
         </p:txBody>
       </p:sp>
@@ -13636,18 +13615,12 @@
             </a:pPr>
             <a:r>
               <a:rPr lang="en-US" sz="2400" dirty="0" smtClean="0">
-                <a:solidFill>
-                  <a:schemeClr val="bg1"/>
-                </a:solidFill>
                 <a:latin typeface="Arial" panose="020B0604020202020204" pitchFamily="34" charset="0"/>
                 <a:cs typeface="Arial" panose="020B0604020202020204" pitchFamily="34" charset="0"/>
               </a:rPr>
               <a:t>Power outage</a:t>
             </a:r>
             <a:endParaRPr lang="en-US" sz="2400" dirty="0">
-              <a:solidFill>
-                <a:schemeClr val="bg1"/>
-              </a:solidFill>
               <a:latin typeface="Arial" panose="020B0604020202020204" pitchFamily="34" charset="0"/>
               <a:cs typeface="Arial" panose="020B0604020202020204" pitchFamily="34" charset="0"/>
             </a:endParaRPr>

</xml_diff>

<commit_message>
finished cleaning Climate disasters and climate protests.
</commit_message>
<xml_diff>
--- a/figures/source-code-plot/timeseries-frame.pptx
+++ b/figures/source-code-plot/timeseries-frame.pptx
@@ -386,11 +386,11 @@
           <c:showBubbleSize val="0"/>
         </c:dLbls>
         <c:smooth val="0"/>
-        <c:axId val="117582800"/>
-        <c:axId val="117583360"/>
+        <c:axId val="95952208"/>
+        <c:axId val="95952768"/>
       </c:lineChart>
       <c:catAx>
-        <c:axId val="117582800"/>
+        <c:axId val="95952208"/>
         <c:scaling>
           <c:orientation val="minMax"/>
         </c:scaling>
@@ -430,7 +430,7 @@
             <a:endParaRPr lang="en-US"/>
           </a:p>
         </c:txPr>
-        <c:crossAx val="117583360"/>
+        <c:crossAx val="95952768"/>
         <c:crosses val="autoZero"/>
         <c:auto val="1"/>
         <c:lblAlgn val="ctr"/>
@@ -438,7 +438,7 @@
         <c:noMultiLvlLbl val="0"/>
       </c:catAx>
       <c:valAx>
-        <c:axId val="117583360"/>
+        <c:axId val="95952768"/>
         <c:scaling>
           <c:orientation val="minMax"/>
         </c:scaling>
@@ -486,7 +486,7 @@
             <a:endParaRPr lang="en-US"/>
           </a:p>
         </c:txPr>
-        <c:crossAx val="117582800"/>
+        <c:crossAx val="95952208"/>
         <c:crosses val="autoZero"/>
         <c:crossBetween val="between"/>
       </c:valAx>
@@ -798,11 +798,11 @@
         </c:dLbls>
         <c:marker val="1"/>
         <c:smooth val="0"/>
-        <c:axId val="169456960"/>
-        <c:axId val="169457520"/>
+        <c:axId val="113127776"/>
+        <c:axId val="113128336"/>
       </c:lineChart>
       <c:catAx>
-        <c:axId val="169456960"/>
+        <c:axId val="113127776"/>
         <c:scaling>
           <c:orientation val="minMax"/>
         </c:scaling>
@@ -834,15 +834,15 @@
                 <a:solidFill>
                   <a:schemeClr val="tx1"/>
                 </a:solidFill>
-                <a:latin typeface="+mn-lt"/>
-                <a:ea typeface="+mn-ea"/>
-                <a:cs typeface="+mn-cs"/>
+                <a:latin typeface="Times New Roman" panose="02020603050405020304" pitchFamily="18" charset="0"/>
+                <a:ea typeface="+mn-ea"/>
+                <a:cs typeface="Times New Roman" panose="02020603050405020304" pitchFamily="18" charset="0"/>
               </a:defRPr>
             </a:pPr>
             <a:endParaRPr lang="en-US"/>
           </a:p>
         </c:txPr>
-        <c:crossAx val="169457520"/>
+        <c:crossAx val="113128336"/>
         <c:crosses val="autoZero"/>
         <c:auto val="1"/>
         <c:lblAlgn val="ctr"/>
@@ -852,7 +852,7 @@
         <c:noMultiLvlLbl val="0"/>
       </c:catAx>
       <c:valAx>
-        <c:axId val="169457520"/>
+        <c:axId val="113128336"/>
         <c:scaling>
           <c:orientation val="minMax"/>
         </c:scaling>
@@ -898,15 +898,15 @@
                 <a:solidFill>
                   <a:schemeClr val="tx1"/>
                 </a:solidFill>
-                <a:latin typeface="+mn-lt"/>
-                <a:ea typeface="+mn-ea"/>
-                <a:cs typeface="+mn-cs"/>
+                <a:latin typeface="Times New Roman" panose="02020603050405020304" pitchFamily="18" charset="0"/>
+                <a:ea typeface="+mn-ea"/>
+                <a:cs typeface="Times New Roman" panose="02020603050405020304" pitchFamily="18" charset="0"/>
               </a:defRPr>
             </a:pPr>
             <a:endParaRPr lang="en-US"/>
           </a:p>
         </c:txPr>
-        <c:crossAx val="169456960"/>
+        <c:crossAx val="113127776"/>
         <c:crossesAt val="1"/>
         <c:crossBetween val="between"/>
       </c:valAx>
@@ -1215,11 +1215,11 @@
         </c:dLbls>
         <c:marker val="1"/>
         <c:smooth val="0"/>
-        <c:axId val="169737440"/>
-        <c:axId val="169738000"/>
+        <c:axId val="113337952"/>
+        <c:axId val="113338512"/>
       </c:lineChart>
       <c:catAx>
-        <c:axId val="169737440"/>
+        <c:axId val="113337952"/>
         <c:scaling>
           <c:orientation val="minMax"/>
         </c:scaling>
@@ -1259,7 +1259,7 @@
             <a:endParaRPr lang="en-US"/>
           </a:p>
         </c:txPr>
-        <c:crossAx val="169738000"/>
+        <c:crossAx val="113338512"/>
         <c:crosses val="autoZero"/>
         <c:auto val="1"/>
         <c:lblAlgn val="ctr"/>
@@ -1268,7 +1268,7 @@
         <c:noMultiLvlLbl val="0"/>
       </c:catAx>
       <c:valAx>
-        <c:axId val="169738000"/>
+        <c:axId val="113338512"/>
         <c:scaling>
           <c:orientation val="minMax"/>
         </c:scaling>
@@ -1316,7 +1316,7 @@
             <a:endParaRPr lang="en-US"/>
           </a:p>
         </c:txPr>
-        <c:crossAx val="169737440"/>
+        <c:crossAx val="113337952"/>
         <c:crosses val="autoZero"/>
         <c:crossBetween val="between"/>
       </c:valAx>
@@ -3110,7 +3110,7 @@
           <a:p>
             <a:fld id="{BD95DEEB-EB1A-4DBE-9A02-CCA516C4307E}" type="datetimeFigureOut">
               <a:rPr lang="en-US" smtClean="0"/>
-              <a:t>5/1/2016</a:t>
+              <a:t>5/2/2016</a:t>
             </a:fld>
             <a:endParaRPr lang="en-US"/>
           </a:p>
@@ -3677,7 +3677,7 @@
           <a:p>
             <a:fld id="{2DD4BC02-C082-4D59-A56C-B836D2E803E4}" type="datetimeFigureOut">
               <a:rPr lang="en-US" smtClean="0"/>
-              <a:t>5/1/2016</a:t>
+              <a:t>5/2/2016</a:t>
             </a:fld>
             <a:endParaRPr lang="en-US"/>
           </a:p>
@@ -3847,7 +3847,7 @@
           <a:p>
             <a:fld id="{2DD4BC02-C082-4D59-A56C-B836D2E803E4}" type="datetimeFigureOut">
               <a:rPr lang="en-US" smtClean="0"/>
-              <a:t>5/1/2016</a:t>
+              <a:t>5/2/2016</a:t>
             </a:fld>
             <a:endParaRPr lang="en-US"/>
           </a:p>
@@ -4027,7 +4027,7 @@
           <a:p>
             <a:fld id="{2DD4BC02-C082-4D59-A56C-B836D2E803E4}" type="datetimeFigureOut">
               <a:rPr lang="en-US" smtClean="0"/>
-              <a:t>5/1/2016</a:t>
+              <a:t>5/2/2016</a:t>
             </a:fld>
             <a:endParaRPr lang="en-US"/>
           </a:p>
@@ -4197,7 +4197,7 @@
           <a:p>
             <a:fld id="{2DD4BC02-C082-4D59-A56C-B836D2E803E4}" type="datetimeFigureOut">
               <a:rPr lang="en-US" smtClean="0"/>
-              <a:t>5/1/2016</a:t>
+              <a:t>5/2/2016</a:t>
             </a:fld>
             <a:endParaRPr lang="en-US"/>
           </a:p>
@@ -4443,7 +4443,7 @@
           <a:p>
             <a:fld id="{2DD4BC02-C082-4D59-A56C-B836D2E803E4}" type="datetimeFigureOut">
               <a:rPr lang="en-US" smtClean="0"/>
-              <a:t>5/1/2016</a:t>
+              <a:t>5/2/2016</a:t>
             </a:fld>
             <a:endParaRPr lang="en-US"/>
           </a:p>
@@ -4675,7 +4675,7 @@
           <a:p>
             <a:fld id="{2DD4BC02-C082-4D59-A56C-B836D2E803E4}" type="datetimeFigureOut">
               <a:rPr lang="en-US" smtClean="0"/>
-              <a:t>5/1/2016</a:t>
+              <a:t>5/2/2016</a:t>
             </a:fld>
             <a:endParaRPr lang="en-US"/>
           </a:p>
@@ -5042,7 +5042,7 @@
           <a:p>
             <a:fld id="{2DD4BC02-C082-4D59-A56C-B836D2E803E4}" type="datetimeFigureOut">
               <a:rPr lang="en-US" smtClean="0"/>
-              <a:t>5/1/2016</a:t>
+              <a:t>5/2/2016</a:t>
             </a:fld>
             <a:endParaRPr lang="en-US"/>
           </a:p>
@@ -5160,7 +5160,7 @@
           <a:p>
             <a:fld id="{2DD4BC02-C082-4D59-A56C-B836D2E803E4}" type="datetimeFigureOut">
               <a:rPr lang="en-US" smtClean="0"/>
-              <a:t>5/1/2016</a:t>
+              <a:t>5/2/2016</a:t>
             </a:fld>
             <a:endParaRPr lang="en-US"/>
           </a:p>
@@ -5255,7 +5255,7 @@
           <a:p>
             <a:fld id="{2DD4BC02-C082-4D59-A56C-B836D2E803E4}" type="datetimeFigureOut">
               <a:rPr lang="en-US" smtClean="0"/>
-              <a:t>5/1/2016</a:t>
+              <a:t>5/2/2016</a:t>
             </a:fld>
             <a:endParaRPr lang="en-US"/>
           </a:p>
@@ -5532,7 +5532,7 @@
           <a:p>
             <a:fld id="{2DD4BC02-C082-4D59-A56C-B836D2E803E4}" type="datetimeFigureOut">
               <a:rPr lang="en-US" smtClean="0"/>
-              <a:t>5/1/2016</a:t>
+              <a:t>5/2/2016</a:t>
             </a:fld>
             <a:endParaRPr lang="en-US"/>
           </a:p>
@@ -5785,7 +5785,7 @@
           <a:p>
             <a:fld id="{2DD4BC02-C082-4D59-A56C-B836D2E803E4}" type="datetimeFigureOut">
               <a:rPr lang="en-US" smtClean="0"/>
-              <a:t>5/1/2016</a:t>
+              <a:t>5/2/2016</a:t>
             </a:fld>
             <a:endParaRPr lang="en-US"/>
           </a:p>
@@ -5998,7 +5998,7 @@
           <a:p>
             <a:fld id="{2DD4BC02-C082-4D59-A56C-B836D2E803E4}" type="datetimeFigureOut">
               <a:rPr lang="en-US" smtClean="0"/>
-              <a:t>5/1/2016</a:t>
+              <a:t>5/2/2016</a:t>
             </a:fld>
             <a:endParaRPr lang="en-US"/>
           </a:p>
@@ -13755,11 +13755,11 @@
             <a:avLst/>
           </a:prstGeom>
           <a:solidFill>
-            <a:srgbClr val="FF9999"/>
+            <a:srgbClr val="FFFF00"/>
           </a:solidFill>
           <a:ln>
             <a:solidFill>
-              <a:srgbClr val="FF9999"/>
+              <a:srgbClr val="FFFF00"/>
             </a:solidFill>
           </a:ln>
         </p:spPr>
@@ -13803,11 +13803,11 @@
             <a:avLst/>
           </a:prstGeom>
           <a:solidFill>
-            <a:srgbClr val="FF9999"/>
+            <a:srgbClr val="FFFF00"/>
           </a:solidFill>
           <a:ln>
             <a:solidFill>
-              <a:srgbClr val="FF9999"/>
+              <a:srgbClr val="FFFF00"/>
             </a:solidFill>
           </a:ln>
         </p:spPr>
@@ -13851,11 +13851,11 @@
             <a:avLst/>
           </a:prstGeom>
           <a:solidFill>
-            <a:srgbClr val="FF9999"/>
+            <a:srgbClr val="FFFF00"/>
           </a:solidFill>
           <a:ln>
             <a:solidFill>
-              <a:srgbClr val="FF9999"/>
+              <a:srgbClr val="FFFF00"/>
             </a:solidFill>
           </a:ln>
         </p:spPr>
@@ -14134,7 +14134,7 @@
           <p:nvPr>
             <p:extLst>
               <p:ext uri="{D42A27DB-BD31-4B8C-83A1-F6EECF244321}">
-                <p14:modId xmlns:p14="http://schemas.microsoft.com/office/powerpoint/2010/main" val="3319724857"/>
+                <p14:modId xmlns:p14="http://schemas.microsoft.com/office/powerpoint/2010/main" val="3287086863"/>
               </p:ext>
             </p:extLst>
           </p:nvPr>
@@ -14259,18 +14259,18 @@
         </p:nvSpPr>
         <p:spPr>
           <a:xfrm>
-            <a:off x="4781340" y="3507475"/>
-            <a:ext cx="354842" cy="1427772"/>
+            <a:off x="4781340" y="4231777"/>
+            <a:ext cx="354842" cy="703469"/>
           </a:xfrm>
           <a:prstGeom prst="rect">
             <a:avLst/>
           </a:prstGeom>
           <a:solidFill>
-            <a:srgbClr val="FF9999"/>
+            <a:srgbClr val="FF00FF"/>
           </a:solidFill>
           <a:ln>
             <a:solidFill>
-              <a:srgbClr val="FF9999"/>
+              <a:srgbClr val="FF00FF"/>
             </a:solidFill>
           </a:ln>
         </p:spPr>
@@ -14561,54 +14561,6 @@
           </a:fontRef>
         </p:style>
       </p:cxnSp>
-      <p:sp>
-        <p:nvSpPr>
-          <p:cNvPr id="11" name="Rectangle 10"/>
-          <p:cNvSpPr/>
-          <p:nvPr/>
-        </p:nvSpPr>
-        <p:spPr>
-          <a:xfrm>
-            <a:off x="5397727" y="3507476"/>
-            <a:ext cx="354842" cy="1427772"/>
-          </a:xfrm>
-          <a:prstGeom prst="rect">
-            <a:avLst/>
-          </a:prstGeom>
-          <a:solidFill>
-            <a:srgbClr val="FF9999"/>
-          </a:solidFill>
-          <a:ln>
-            <a:solidFill>
-              <a:srgbClr val="FF9999"/>
-            </a:solidFill>
-          </a:ln>
-        </p:spPr>
-        <p:style>
-          <a:lnRef idx="2">
-            <a:schemeClr val="accent1">
-              <a:shade val="50000"/>
-            </a:schemeClr>
-          </a:lnRef>
-          <a:fillRef idx="1">
-            <a:schemeClr val="accent1"/>
-          </a:fillRef>
-          <a:effectRef idx="0">
-            <a:schemeClr val="accent1"/>
-          </a:effectRef>
-          <a:fontRef idx="minor">
-            <a:schemeClr val="lt1"/>
-          </a:fontRef>
-        </p:style>
-        <p:txBody>
-          <a:bodyPr rtlCol="0" anchor="ctr"/>
-          <a:lstStyle/>
-          <a:p>
-            <a:pPr algn="ctr"/>
-            <a:endParaRPr lang="en-US"/>
-          </a:p>
-        </p:txBody>
-      </p:sp>
       <p:sp>
         <p:nvSpPr>
           <p:cNvPr id="12" name="Rectangle 11"/>
@@ -14982,8 +14934,8 @@
         </p:nvSpPr>
         <p:spPr>
           <a:xfrm>
-            <a:off x="8872183" y="1617405"/>
-            <a:ext cx="2878539" cy="983320"/>
+            <a:off x="8872184" y="1617405"/>
+            <a:ext cx="2141559" cy="1194034"/>
           </a:xfrm>
           <a:prstGeom prst="rect">
             <a:avLst/>
@@ -15245,8 +15197,8 @@
         </p:nvSpPr>
         <p:spPr>
           <a:xfrm>
-            <a:off x="5895871" y="1549169"/>
-            <a:ext cx="1612712" cy="880135"/>
+            <a:off x="5596721" y="1453340"/>
+            <a:ext cx="1646989" cy="894074"/>
           </a:xfrm>
           <a:prstGeom prst="rect">
             <a:avLst/>
@@ -15482,7 +15434,7 @@
         </p:nvSpPr>
         <p:spPr>
           <a:xfrm>
-            <a:off x="6828715" y="-4213"/>
+            <a:off x="6924251" y="-4213"/>
             <a:ext cx="4086935" cy="864022"/>
           </a:xfrm>
           <a:prstGeom prst="rect">
@@ -15719,6 +15671,42 @@
           <a:xfrm flipH="1">
             <a:off x="7877073" y="859809"/>
             <a:ext cx="134163" cy="787410"/>
+          </a:xfrm>
+          <a:prstGeom prst="straightConnector1">
+            <a:avLst/>
+          </a:prstGeom>
+          <a:ln w="38100">
+            <a:solidFill>
+              <a:srgbClr val="00B050"/>
+            </a:solidFill>
+            <a:tailEnd type="triangle"/>
+          </a:ln>
+        </p:spPr>
+        <p:style>
+          <a:lnRef idx="1">
+            <a:schemeClr val="accent1"/>
+          </a:lnRef>
+          <a:fillRef idx="0">
+            <a:schemeClr val="accent1"/>
+          </a:fillRef>
+          <a:effectRef idx="0">
+            <a:schemeClr val="accent1"/>
+          </a:effectRef>
+          <a:fontRef idx="minor">
+            <a:schemeClr val="tx1"/>
+          </a:fontRef>
+        </p:style>
+      </p:cxnSp>
+      <p:cxnSp>
+        <p:nvCxnSpPr>
+          <p:cNvPr id="18" name="Straight Arrow Connector 17"/>
+          <p:cNvCxnSpPr/>
+          <p:nvPr/>
+        </p:nvCxnSpPr>
+        <p:spPr>
+          <a:xfrm>
+            <a:off x="7243710" y="1815152"/>
+            <a:ext cx="317849" cy="225528"/>
           </a:xfrm>
           <a:prstGeom prst="straightConnector1">
             <a:avLst/>

</xml_diff>